<commit_message>
ADD more info about db
</commit_message>
<xml_diff>
--- a/documentation/Trap them.pptx
+++ b/documentation/Trap them.pptx
@@ -3840,10 +3840,10 @@
           <p:cNvPr id="8" name="Rectangle 7">
             <a:extLst>
               <a:ext uri="{FF2B5EF4-FFF2-40B4-BE49-F238E27FC236}">
-                <a16:creationId xmlns:a16="http://schemas.microsoft.com/office/drawing/2014/main" id="{8C6E698C-8155-4B8B-BDC9-B7299772B509}"/>
+                <a16:creationId xmlns:a16="http://schemas.microsoft.com/office/drawing/2014/main" xmlns="" id="{8C6E698C-8155-4B8B-BDC9-B7299772B509}"/>
               </a:ext>
               <a:ext uri="{C183D7F6-B498-43B3-948B-1728B52AA6E4}">
-                <adec:decorative xmlns:adec="http://schemas.microsoft.com/office/drawing/2017/decorative" xmlns="" val="1"/>
+                <adec:decorative xmlns="" xmlns:adec="http://schemas.microsoft.com/office/drawing/2017/decorative" val="1"/>
               </a:ext>
             </a:extLst>
           </p:cNvPr>
@@ -3853,7 +3853,7 @@
           <p:nvPr>
             <p:extLst>
               <p:ext uri="{386F3935-93C4-4BCD-93E2-E3B085C9AB24}">
-                <p16:designElem xmlns:p16="http://schemas.microsoft.com/office/powerpoint/2015/main" val="1"/>
+                <p16:designElem xmlns:p16="http://schemas.microsoft.com/office/powerpoint/2015/main" xmlns="" val="1"/>
               </p:ext>
             </p:extLst>
           </p:nvPr>
@@ -3938,10 +3938,10 @@
           <p:cNvPr id="10" name="Rectangle 9">
             <a:extLst>
               <a:ext uri="{FF2B5EF4-FFF2-40B4-BE49-F238E27FC236}">
-                <a16:creationId xmlns:a16="http://schemas.microsoft.com/office/drawing/2014/main" id="{0EEF5601-A8BC-411D-AA64-3E79320BA122}"/>
+                <a16:creationId xmlns:a16="http://schemas.microsoft.com/office/drawing/2014/main" xmlns="" id="{0EEF5601-A8BC-411D-AA64-3E79320BA122}"/>
               </a:ext>
               <a:ext uri="{C183D7F6-B498-43B3-948B-1728B52AA6E4}">
-                <adec:decorative xmlns:adec="http://schemas.microsoft.com/office/drawing/2017/decorative" xmlns="" val="1"/>
+                <adec:decorative xmlns="" xmlns:adec="http://schemas.microsoft.com/office/drawing/2017/decorative" val="1"/>
               </a:ext>
             </a:extLst>
           </p:cNvPr>
@@ -3951,7 +3951,7 @@
           <p:nvPr>
             <p:extLst>
               <p:ext uri="{386F3935-93C4-4BCD-93E2-E3B085C9AB24}">
-                <p16:designElem xmlns:p16="http://schemas.microsoft.com/office/powerpoint/2015/main" val="1"/>
+                <p16:designElem xmlns:p16="http://schemas.microsoft.com/office/powerpoint/2015/main" xmlns="" val="1"/>
               </p:ext>
             </p:extLst>
           </p:nvPr>
@@ -4042,10 +4042,10 @@
           <p:cNvPr id="12" name="Rectangle 11">
             <a:extLst>
               <a:ext uri="{FF2B5EF4-FFF2-40B4-BE49-F238E27FC236}">
-                <a16:creationId xmlns:a16="http://schemas.microsoft.com/office/drawing/2014/main" id="{33209156-242F-4B26-8D07-CEB2B68A9F9A}"/>
+                <a16:creationId xmlns:a16="http://schemas.microsoft.com/office/drawing/2014/main" xmlns="" id="{33209156-242F-4B26-8D07-CEB2B68A9F9A}"/>
               </a:ext>
               <a:ext uri="{C183D7F6-B498-43B3-948B-1728B52AA6E4}">
-                <adec:decorative xmlns:adec="http://schemas.microsoft.com/office/drawing/2017/decorative" xmlns="" val="1"/>
+                <adec:decorative xmlns="" xmlns:adec="http://schemas.microsoft.com/office/drawing/2017/decorative" val="1"/>
               </a:ext>
             </a:extLst>
           </p:cNvPr>
@@ -4055,7 +4055,7 @@
           <p:nvPr>
             <p:extLst>
               <p:ext uri="{386F3935-93C4-4BCD-93E2-E3B085C9AB24}">
-                <p16:designElem xmlns:p16="http://schemas.microsoft.com/office/powerpoint/2015/main" val="1"/>
+                <p16:designElem xmlns:p16="http://schemas.microsoft.com/office/powerpoint/2015/main" xmlns="" val="1"/>
               </p:ext>
             </p:extLst>
           </p:nvPr>
@@ -4142,10 +4142,10 @@
           <p:cNvPr id="11" name="Rectangle 9">
             <a:extLst>
               <a:ext uri="{FF2B5EF4-FFF2-40B4-BE49-F238E27FC236}">
-                <a16:creationId xmlns:a16="http://schemas.microsoft.com/office/drawing/2014/main" id="{990D0034-F768-41E7-85D4-F38C4DE85770}"/>
+                <a16:creationId xmlns:a16="http://schemas.microsoft.com/office/drawing/2014/main" xmlns="" id="{990D0034-F768-41E7-85D4-F38C4DE85770}"/>
               </a:ext>
               <a:ext uri="{C183D7F6-B498-43B3-948B-1728B52AA6E4}">
-                <adec:decorative xmlns:adec="http://schemas.microsoft.com/office/drawing/2017/decorative" xmlns="" val="1"/>
+                <adec:decorative xmlns="" xmlns:adec="http://schemas.microsoft.com/office/drawing/2017/decorative" val="1"/>
               </a:ext>
             </a:extLst>
           </p:cNvPr>
@@ -4155,7 +4155,7 @@
           <p:nvPr>
             <p:extLst>
               <p:ext uri="{386F3935-93C4-4BCD-93E2-E3B085C9AB24}">
-                <p16:designElem xmlns:p16="http://schemas.microsoft.com/office/powerpoint/2015/main" val="1"/>
+                <p16:designElem xmlns:p16="http://schemas.microsoft.com/office/powerpoint/2015/main" xmlns="" val="1"/>
               </p:ext>
             </p:extLst>
           </p:nvPr>
@@ -4241,10 +4241,10 @@
           <p:cNvPr id="13" name="Straight Connector 11">
             <a:extLst>
               <a:ext uri="{FF2B5EF4-FFF2-40B4-BE49-F238E27FC236}">
-                <a16:creationId xmlns:a16="http://schemas.microsoft.com/office/drawing/2014/main" id="{5A0A5CF6-407C-4691-8122-49DF69D0020D}"/>
+                <a16:creationId xmlns:a16="http://schemas.microsoft.com/office/drawing/2014/main" xmlns="" id="{5A0A5CF6-407C-4691-8122-49DF69D0020D}"/>
               </a:ext>
               <a:ext uri="{C183D7F6-B498-43B3-948B-1728B52AA6E4}">
-                <adec:decorative xmlns:adec="http://schemas.microsoft.com/office/drawing/2017/decorative" xmlns="" val="1"/>
+                <adec:decorative xmlns="" xmlns:adec="http://schemas.microsoft.com/office/drawing/2017/decorative" val="1"/>
               </a:ext>
             </a:extLst>
           </p:cNvPr>
@@ -4254,7 +4254,7 @@
           <p:nvPr>
             <p:extLst>
               <p:ext uri="{386F3935-93C4-4BCD-93E2-E3B085C9AB24}">
-                <p16:designElem xmlns:p16="http://schemas.microsoft.com/office/powerpoint/2015/main" val="1"/>
+                <p16:designElem xmlns:p16="http://schemas.microsoft.com/office/powerpoint/2015/main" xmlns="" val="1"/>
               </p:ext>
             </p:extLst>
           </p:nvPr>
@@ -4505,7 +4505,6 @@
               <a:rPr lang="ru-RU" dirty="0"/>
               <a:t>Краткое описание игры</a:t>
             </a:r>
-            <a:endParaRPr lang="ru-RU" dirty="0"/>
           </a:p>
         </p:txBody>
       </p:sp>
@@ -4662,10 +4661,10 @@
           <p:cNvPr id="11" name="Rectangle 10">
             <a:extLst>
               <a:ext uri="{FF2B5EF4-FFF2-40B4-BE49-F238E27FC236}">
-                <a16:creationId xmlns:a16="http://schemas.microsoft.com/office/drawing/2014/main" id="{990D0034-F768-41E7-85D4-F38C4DE85770}"/>
+                <a16:creationId xmlns:a16="http://schemas.microsoft.com/office/drawing/2014/main" xmlns="" id="{990D0034-F768-41E7-85D4-F38C4DE85770}"/>
               </a:ext>
               <a:ext uri="{C183D7F6-B498-43B3-948B-1728B52AA6E4}">
-                <adec:decorative xmlns:adec="http://schemas.microsoft.com/office/drawing/2017/decorative" xmlns="" val="1"/>
+                <adec:decorative xmlns="" xmlns:adec="http://schemas.microsoft.com/office/drawing/2017/decorative" val="1"/>
               </a:ext>
             </a:extLst>
           </p:cNvPr>
@@ -4675,7 +4674,7 @@
           <p:nvPr>
             <p:extLst>
               <p:ext uri="{386F3935-93C4-4BCD-93E2-E3B085C9AB24}">
-                <p16:designElem xmlns:p16="http://schemas.microsoft.com/office/powerpoint/2015/main" val="1"/>
+                <p16:designElem xmlns:p16="http://schemas.microsoft.com/office/powerpoint/2015/main" xmlns="" val="1"/>
               </p:ext>
             </p:extLst>
           </p:nvPr>
@@ -4722,10 +4721,10 @@
           <p:cNvPr id="13" name="Rectangle 12">
             <a:extLst>
               <a:ext uri="{FF2B5EF4-FFF2-40B4-BE49-F238E27FC236}">
-                <a16:creationId xmlns:a16="http://schemas.microsoft.com/office/drawing/2014/main" id="{C4F7E42D-8B5A-4FC8-81CD-9E60171F7FA8}"/>
+                <a16:creationId xmlns:a16="http://schemas.microsoft.com/office/drawing/2014/main" xmlns="" id="{C4F7E42D-8B5A-4FC8-81CD-9E60171F7FA8}"/>
               </a:ext>
               <a:ext uri="{C183D7F6-B498-43B3-948B-1728B52AA6E4}">
-                <adec:decorative xmlns:adec="http://schemas.microsoft.com/office/drawing/2017/decorative" xmlns="" val="1"/>
+                <adec:decorative xmlns="" xmlns:adec="http://schemas.microsoft.com/office/drawing/2017/decorative" val="1"/>
               </a:ext>
             </a:extLst>
           </p:cNvPr>
@@ -4735,7 +4734,7 @@
           <p:nvPr>
             <p:extLst>
               <p:ext uri="{386F3935-93C4-4BCD-93E2-E3B085C9AB24}">
-                <p16:designElem xmlns:p16="http://schemas.microsoft.com/office/powerpoint/2015/main" val="1"/>
+                <p16:designElem xmlns:p16="http://schemas.microsoft.com/office/powerpoint/2015/main" xmlns="" val="1"/>
               </p:ext>
             </p:extLst>
           </p:nvPr>
@@ -4990,10 +4989,10 @@
           <p:cNvPr id="15" name="Rectangle 14">
             <a:extLst>
               <a:ext uri="{FF2B5EF4-FFF2-40B4-BE49-F238E27FC236}">
-                <a16:creationId xmlns:a16="http://schemas.microsoft.com/office/drawing/2014/main" id="{8C04651D-B9F4-4935-A02D-364153FBDF54}"/>
+                <a16:creationId xmlns:a16="http://schemas.microsoft.com/office/drawing/2014/main" xmlns="" id="{8C04651D-B9F4-4935-A02D-364153FBDF54}"/>
               </a:ext>
               <a:ext uri="{C183D7F6-B498-43B3-948B-1728B52AA6E4}">
-                <adec:decorative xmlns:adec="http://schemas.microsoft.com/office/drawing/2017/decorative" xmlns="" val="1"/>
+                <adec:decorative xmlns="" xmlns:adec="http://schemas.microsoft.com/office/drawing/2017/decorative" val="1"/>
               </a:ext>
             </a:extLst>
           </p:cNvPr>
@@ -5003,7 +5002,7 @@
           <p:nvPr>
             <p:extLst>
               <p:ext uri="{386F3935-93C4-4BCD-93E2-E3B085C9AB24}">
-                <p16:designElem xmlns:p16="http://schemas.microsoft.com/office/powerpoint/2015/main" val="1"/>
+                <p16:designElem xmlns:p16="http://schemas.microsoft.com/office/powerpoint/2015/main" xmlns="" val="1"/>
               </p:ext>
             </p:extLst>
           </p:nvPr>
@@ -5090,10 +5089,10 @@
           <p:cNvPr id="20" name="Rectangle 22">
             <a:extLst>
               <a:ext uri="{FF2B5EF4-FFF2-40B4-BE49-F238E27FC236}">
-                <a16:creationId xmlns:a16="http://schemas.microsoft.com/office/drawing/2014/main" id="{25C8D2C1-DA83-420D-9635-D52CE066B5DA}"/>
+                <a16:creationId xmlns:a16="http://schemas.microsoft.com/office/drawing/2014/main" xmlns="" id="{25C8D2C1-DA83-420D-9635-D52CE066B5DA}"/>
               </a:ext>
               <a:ext uri="{C183D7F6-B498-43B3-948B-1728B52AA6E4}">
-                <adec:decorative xmlns:adec="http://schemas.microsoft.com/office/drawing/2017/decorative" xmlns="" val="1"/>
+                <adec:decorative xmlns="" xmlns:adec="http://schemas.microsoft.com/office/drawing/2017/decorative" val="1"/>
               </a:ext>
             </a:extLst>
           </p:cNvPr>
@@ -5103,7 +5102,7 @@
           <p:nvPr>
             <p:extLst>
               <p:ext uri="{386F3935-93C4-4BCD-93E2-E3B085C9AB24}">
-                <p16:designElem xmlns:p16="http://schemas.microsoft.com/office/powerpoint/2015/main" val="1"/>
+                <p16:designElem xmlns:p16="http://schemas.microsoft.com/office/powerpoint/2015/main" xmlns="" val="1"/>
               </p:ext>
             </p:extLst>
           </p:nvPr>
@@ -5145,10 +5144,10 @@
           <p:cNvPr id="21" name="Rectangle 24">
             <a:extLst>
               <a:ext uri="{FF2B5EF4-FFF2-40B4-BE49-F238E27FC236}">
-                <a16:creationId xmlns:a16="http://schemas.microsoft.com/office/drawing/2014/main" id="{434F74C9-6A0B-409E-AD1C-45B58BE91BB8}"/>
+                <a16:creationId xmlns:a16="http://schemas.microsoft.com/office/drawing/2014/main" xmlns="" id="{434F74C9-6A0B-409E-AD1C-45B58BE91BB8}"/>
               </a:ext>
               <a:ext uri="{C183D7F6-B498-43B3-948B-1728B52AA6E4}">
-                <adec:decorative xmlns:adec="http://schemas.microsoft.com/office/drawing/2017/decorative" xmlns="" val="1"/>
+                <adec:decorative xmlns="" xmlns:adec="http://schemas.microsoft.com/office/drawing/2017/decorative" val="1"/>
               </a:ext>
             </a:extLst>
           </p:cNvPr>
@@ -5158,7 +5157,7 @@
           <p:nvPr>
             <p:extLst>
               <p:ext uri="{386F3935-93C4-4BCD-93E2-E3B085C9AB24}">
-                <p16:designElem xmlns:p16="http://schemas.microsoft.com/office/powerpoint/2015/main" val="1"/>
+                <p16:designElem xmlns:p16="http://schemas.microsoft.com/office/powerpoint/2015/main" xmlns="" val="1"/>
               </p:ext>
             </p:extLst>
           </p:nvPr>
@@ -5200,10 +5199,10 @@
           <p:cNvPr id="22" name="Straight Connector 26">
             <a:extLst>
               <a:ext uri="{FF2B5EF4-FFF2-40B4-BE49-F238E27FC236}">
-                <a16:creationId xmlns:a16="http://schemas.microsoft.com/office/drawing/2014/main" id="{F5486A9D-1265-4B57-91E6-68E666B978BC}"/>
+                <a16:creationId xmlns:a16="http://schemas.microsoft.com/office/drawing/2014/main" xmlns="" id="{F5486A9D-1265-4B57-91E6-68E666B978BC}"/>
               </a:ext>
               <a:ext uri="{C183D7F6-B498-43B3-948B-1728B52AA6E4}">
-                <adec:decorative xmlns:adec="http://schemas.microsoft.com/office/drawing/2017/decorative" xmlns="" val="1"/>
+                <adec:decorative xmlns="" xmlns:adec="http://schemas.microsoft.com/office/drawing/2017/decorative" val="1"/>
               </a:ext>
             </a:extLst>
           </p:cNvPr>
@@ -5213,7 +5212,7 @@
           <p:nvPr>
             <p:extLst>
               <p:ext uri="{386F3935-93C4-4BCD-93E2-E3B085C9AB24}">
-                <p16:designElem xmlns:p16="http://schemas.microsoft.com/office/powerpoint/2015/main" val="1"/>
+                <p16:designElem xmlns:p16="http://schemas.microsoft.com/office/powerpoint/2015/main" xmlns="" val="1"/>
               </p:ext>
             </p:extLst>
           </p:nvPr>
@@ -5255,10 +5254,10 @@
           <p:cNvPr id="24" name="Rectangle 28">
             <a:extLst>
               <a:ext uri="{FF2B5EF4-FFF2-40B4-BE49-F238E27FC236}">
-                <a16:creationId xmlns:a16="http://schemas.microsoft.com/office/drawing/2014/main" id="{F452A527-3631-41ED-858D-3777A7D1496A}"/>
+                <a16:creationId xmlns:a16="http://schemas.microsoft.com/office/drawing/2014/main" xmlns="" id="{F452A527-3631-41ED-858D-3777A7D1496A}"/>
               </a:ext>
               <a:ext uri="{C183D7F6-B498-43B3-948B-1728B52AA6E4}">
-                <adec:decorative xmlns:adec="http://schemas.microsoft.com/office/drawing/2017/decorative" xmlns="" val="1"/>
+                <adec:decorative xmlns="" xmlns:adec="http://schemas.microsoft.com/office/drawing/2017/decorative" val="1"/>
               </a:ext>
             </a:extLst>
           </p:cNvPr>
@@ -5268,7 +5267,7 @@
           <p:nvPr>
             <p:extLst>
               <p:ext uri="{386F3935-93C4-4BCD-93E2-E3B085C9AB24}">
-                <p16:designElem xmlns:p16="http://schemas.microsoft.com/office/powerpoint/2015/main" val="1"/>
+                <p16:designElem xmlns:p16="http://schemas.microsoft.com/office/powerpoint/2015/main" xmlns="" val="1"/>
               </p:ext>
             </p:extLst>
           </p:nvPr>
@@ -5500,10 +5499,10 @@
           <p:cNvPr id="26" name="Straight Connector 30">
             <a:extLst>
               <a:ext uri="{FF2B5EF4-FFF2-40B4-BE49-F238E27FC236}">
-                <a16:creationId xmlns:a16="http://schemas.microsoft.com/office/drawing/2014/main" id="{D28A9C89-B313-458F-9C85-515930A51A93}"/>
+                <a16:creationId xmlns:a16="http://schemas.microsoft.com/office/drawing/2014/main" xmlns="" id="{D28A9C89-B313-458F-9C85-515930A51A93}"/>
               </a:ext>
               <a:ext uri="{C183D7F6-B498-43B3-948B-1728B52AA6E4}">
-                <adec:decorative xmlns:adec="http://schemas.microsoft.com/office/drawing/2017/decorative" xmlns="" val="1"/>
+                <adec:decorative xmlns="" xmlns:adec="http://schemas.microsoft.com/office/drawing/2017/decorative" val="1"/>
               </a:ext>
             </a:extLst>
           </p:cNvPr>
@@ -5513,7 +5512,7 @@
           <p:nvPr>
             <p:extLst>
               <p:ext uri="{386F3935-93C4-4BCD-93E2-E3B085C9AB24}">
-                <p16:designElem xmlns:p16="http://schemas.microsoft.com/office/powerpoint/2015/main" val="1"/>
+                <p16:designElem xmlns:p16="http://schemas.microsoft.com/office/powerpoint/2015/main" xmlns="" val="1"/>
               </p:ext>
             </p:extLst>
           </p:nvPr>
@@ -5599,10 +5598,10 @@
           <p:cNvPr id="1050" name="Rectangle 88">
             <a:extLst>
               <a:ext uri="{FF2B5EF4-FFF2-40B4-BE49-F238E27FC236}">
-                <a16:creationId xmlns:a16="http://schemas.microsoft.com/office/drawing/2014/main" id="{284B70D5-875B-433D-BDBD-1522A85D6C1D}"/>
+                <a16:creationId xmlns:a16="http://schemas.microsoft.com/office/drawing/2014/main" xmlns="" id="{284B70D5-875B-433D-BDBD-1522A85D6C1D}"/>
               </a:ext>
               <a:ext uri="{C183D7F6-B498-43B3-948B-1728B52AA6E4}">
-                <adec:decorative xmlns:adec="http://schemas.microsoft.com/office/drawing/2017/decorative" xmlns="" val="1"/>
+                <adec:decorative xmlns="" xmlns:adec="http://schemas.microsoft.com/office/drawing/2017/decorative" val="1"/>
               </a:ext>
             </a:extLst>
           </p:cNvPr>
@@ -5612,7 +5611,7 @@
           <p:nvPr>
             <p:extLst>
               <p:ext uri="{386F3935-93C4-4BCD-93E2-E3B085C9AB24}">
-                <p16:designElem xmlns:p16="http://schemas.microsoft.com/office/powerpoint/2015/main" val="1"/>
+                <p16:designElem xmlns:p16="http://schemas.microsoft.com/office/powerpoint/2015/main" xmlns="" val="1"/>
               </p:ext>
             </p:extLst>
           </p:nvPr>
@@ -5688,10 +5687,10 @@
           <p:cNvPr id="1051" name="Straight Connector 90">
             <a:extLst>
               <a:ext uri="{FF2B5EF4-FFF2-40B4-BE49-F238E27FC236}">
-                <a16:creationId xmlns:a16="http://schemas.microsoft.com/office/drawing/2014/main" id="{C947DF4A-614C-4B4C-8B80-E5B9D8E8CFED}"/>
+                <a16:creationId xmlns:a16="http://schemas.microsoft.com/office/drawing/2014/main" xmlns="" id="{C947DF4A-614C-4B4C-8B80-E5B9D8E8CFED}"/>
               </a:ext>
               <a:ext uri="{C183D7F6-B498-43B3-948B-1728B52AA6E4}">
-                <adec:decorative xmlns:adec="http://schemas.microsoft.com/office/drawing/2017/decorative" xmlns="" val="1"/>
+                <adec:decorative xmlns="" xmlns:adec="http://schemas.microsoft.com/office/drawing/2017/decorative" val="1"/>
               </a:ext>
             </a:extLst>
           </p:cNvPr>
@@ -5701,7 +5700,7 @@
           <p:nvPr>
             <p:extLst>
               <p:ext uri="{386F3935-93C4-4BCD-93E2-E3B085C9AB24}">
-                <p16:designElem xmlns:p16="http://schemas.microsoft.com/office/powerpoint/2015/main" val="1"/>
+                <p16:designElem xmlns:p16="http://schemas.microsoft.com/office/powerpoint/2015/main" xmlns="" val="1"/>
               </p:ext>
             </p:extLst>
           </p:nvPr>
@@ -5773,10 +5772,10 @@
           <p:cNvPr id="1052" name="Rectangle 92">
             <a:extLst>
               <a:ext uri="{FF2B5EF4-FFF2-40B4-BE49-F238E27FC236}">
-                <a16:creationId xmlns:a16="http://schemas.microsoft.com/office/drawing/2014/main" id="{1E299956-A9E7-4FC1-A0B1-D590CA9730E8}"/>
+                <a16:creationId xmlns:a16="http://schemas.microsoft.com/office/drawing/2014/main" xmlns="" id="{1E299956-A9E7-4FC1-A0B1-D590CA9730E8}"/>
               </a:ext>
               <a:ext uri="{C183D7F6-B498-43B3-948B-1728B52AA6E4}">
-                <adec:decorative xmlns:adec="http://schemas.microsoft.com/office/drawing/2017/decorative" xmlns="" val="1"/>
+                <adec:decorative xmlns="" xmlns:adec="http://schemas.microsoft.com/office/drawing/2017/decorative" val="1"/>
               </a:ext>
             </a:extLst>
           </p:cNvPr>
@@ -5786,7 +5785,7 @@
           <p:nvPr>
             <p:extLst>
               <p:ext uri="{386F3935-93C4-4BCD-93E2-E3B085C9AB24}">
-                <p16:designElem xmlns:p16="http://schemas.microsoft.com/office/powerpoint/2015/main" val="1"/>
+                <p16:designElem xmlns:p16="http://schemas.microsoft.com/office/powerpoint/2015/main" xmlns="" val="1"/>
               </p:ext>
             </p:extLst>
           </p:nvPr>
@@ -5828,10 +5827,10 @@
           <p:cNvPr id="1053" name="Rectangle 94">
             <a:extLst>
               <a:ext uri="{FF2B5EF4-FFF2-40B4-BE49-F238E27FC236}">
-                <a16:creationId xmlns:a16="http://schemas.microsoft.com/office/drawing/2014/main" id="{17FC539C-B783-4B03-9F9E-D13430F3F64F}"/>
+                <a16:creationId xmlns:a16="http://schemas.microsoft.com/office/drawing/2014/main" xmlns="" id="{17FC539C-B783-4B03-9F9E-D13430F3F64F}"/>
               </a:ext>
               <a:ext uri="{C183D7F6-B498-43B3-948B-1728B52AA6E4}">
-                <adec:decorative xmlns:adec="http://schemas.microsoft.com/office/drawing/2017/decorative" xmlns="" val="1"/>
+                <adec:decorative xmlns="" xmlns:adec="http://schemas.microsoft.com/office/drawing/2017/decorative" val="1"/>
               </a:ext>
             </a:extLst>
           </p:cNvPr>
@@ -5841,7 +5840,7 @@
           <p:nvPr>
             <p:extLst>
               <p:ext uri="{386F3935-93C4-4BCD-93E2-E3B085C9AB24}">
-                <p16:designElem xmlns:p16="http://schemas.microsoft.com/office/powerpoint/2015/main" val="1"/>
+                <p16:designElem xmlns:p16="http://schemas.microsoft.com/office/powerpoint/2015/main" xmlns="" val="1"/>
               </p:ext>
             </p:extLst>
           </p:nvPr>
@@ -5958,10 +5957,10 @@
           <p:cNvPr id="2057" name="Rectangle 70">
             <a:extLst>
               <a:ext uri="{FF2B5EF4-FFF2-40B4-BE49-F238E27FC236}">
-                <a16:creationId xmlns:a16="http://schemas.microsoft.com/office/drawing/2014/main" id="{990D0034-F768-41E7-85D4-F38C4DE85770}"/>
+                <a16:creationId xmlns:a16="http://schemas.microsoft.com/office/drawing/2014/main" xmlns="" id="{990D0034-F768-41E7-85D4-F38C4DE85770}"/>
               </a:ext>
               <a:ext uri="{C183D7F6-B498-43B3-948B-1728B52AA6E4}">
-                <adec:decorative xmlns:adec="http://schemas.microsoft.com/office/drawing/2017/decorative" xmlns="" val="1"/>
+                <adec:decorative xmlns="" xmlns:adec="http://schemas.microsoft.com/office/drawing/2017/decorative" val="1"/>
               </a:ext>
             </a:extLst>
           </p:cNvPr>
@@ -5971,7 +5970,7 @@
           <p:nvPr>
             <p:extLst>
               <p:ext uri="{386F3935-93C4-4BCD-93E2-E3B085C9AB24}">
-                <p16:designElem xmlns:p16="http://schemas.microsoft.com/office/powerpoint/2015/main" val="1"/>
+                <p16:designElem xmlns:p16="http://schemas.microsoft.com/office/powerpoint/2015/main" xmlns="" val="1"/>
               </p:ext>
             </p:extLst>
           </p:nvPr>
@@ -6036,9 +6035,10 @@
           <a:lstStyle/>
           <a:p>
             <a:r>
-              <a:rPr lang="ru-RU" sz="3600"/>
-              <a:t>Ловушки и количество ходов</a:t>
-            </a:r>
+              <a:rPr lang="ru-RU" sz="3600" dirty="0" smtClean="0"/>
+              <a:t>Ловушки</a:t>
+            </a:r>
+            <a:endParaRPr lang="ru-RU" sz="3600" dirty="0"/>
           </a:p>
         </p:txBody>
       </p:sp>
@@ -6047,10 +6047,10 @@
           <p:cNvPr id="2058" name="Straight Connector 72">
             <a:extLst>
               <a:ext uri="{FF2B5EF4-FFF2-40B4-BE49-F238E27FC236}">
-                <a16:creationId xmlns:a16="http://schemas.microsoft.com/office/drawing/2014/main" id="{5A0A5CF6-407C-4691-8122-49DF69D0020D}"/>
+                <a16:creationId xmlns:a16="http://schemas.microsoft.com/office/drawing/2014/main" xmlns="" id="{5A0A5CF6-407C-4691-8122-49DF69D0020D}"/>
               </a:ext>
               <a:ext uri="{C183D7F6-B498-43B3-948B-1728B52AA6E4}">
-                <adec:decorative xmlns:adec="http://schemas.microsoft.com/office/drawing/2017/decorative" xmlns="" val="1"/>
+                <adec:decorative xmlns="" xmlns:adec="http://schemas.microsoft.com/office/drawing/2017/decorative" val="1"/>
               </a:ext>
             </a:extLst>
           </p:cNvPr>
@@ -6060,7 +6060,7 @@
           <p:nvPr>
             <p:extLst>
               <p:ext uri="{386F3935-93C4-4BCD-93E2-E3B085C9AB24}">
-                <p16:designElem xmlns:p16="http://schemas.microsoft.com/office/powerpoint/2015/main" val="1"/>
+                <p16:designElem xmlns:p16="http://schemas.microsoft.com/office/powerpoint/2015/main" xmlns="" val="1"/>
               </p:ext>
             </p:extLst>
           </p:nvPr>
@@ -6604,8 +6604,30 @@
           <a:p>
             <a:r>
               <a:rPr lang="ru-RU" dirty="0"/>
-              <a:t>-Кол-во совершённых действий</a:t>
-            </a:r>
+              <a:t>-Кол-во совершённых </a:t>
+            </a:r>
+            <a:r>
+              <a:rPr lang="ru-RU" dirty="0" smtClean="0"/>
+              <a:t>действий</a:t>
+            </a:r>
+            <a:endParaRPr lang="en-US" dirty="0" smtClean="0"/>
+          </a:p>
+          <a:p>
+            <a:r>
+              <a:rPr lang="en-US" dirty="0" smtClean="0"/>
+              <a:t>-</a:t>
+            </a:r>
+            <a:r>
+              <a:rPr lang="ru-RU" dirty="0" smtClean="0"/>
+              <a:t>Кол-во зачищенных мест</a:t>
+            </a:r>
+          </a:p>
+          <a:p>
+            <a:r>
+              <a:rPr lang="ru-RU" dirty="0" smtClean="0"/>
+              <a:t>-Кол-во использованных ловушек</a:t>
+            </a:r>
+            <a:endParaRPr lang="ru-RU" dirty="0"/>
           </a:p>
         </p:txBody>
       </p:sp>

</xml_diff>